<commit_message>
Updated ppt. Moved main transactions slide to end
</commit_message>
<xml_diff>
--- a/xTuple PostBooks Presentation Part B.pptx
+++ b/xTuple PostBooks Presentation Part B.pptx
@@ -15,11 +15,11 @@
     <p:sldId id="264" r:id="rId9"/>
     <p:sldId id="265" r:id="rId10"/>
     <p:sldId id="266" r:id="rId11"/>
-    <p:sldId id="270" r:id="rId12"/>
-    <p:sldId id="268" r:id="rId13"/>
-    <p:sldId id="272" r:id="rId14"/>
-    <p:sldId id="267" r:id="rId15"/>
-    <p:sldId id="269" r:id="rId16"/>
+    <p:sldId id="268" r:id="rId12"/>
+    <p:sldId id="272" r:id="rId13"/>
+    <p:sldId id="267" r:id="rId14"/>
+    <p:sldId id="269" r:id="rId15"/>
+    <p:sldId id="270" r:id="rId16"/>
     <p:sldId id="271" r:id="rId17"/>
   </p:sldIdLst>
   <p:sldSz cx="9144000" cy="6858000" type="screen4x3"/>
@@ -386,7 +386,7 @@
           <a:p>
             <a:fld id="{01B101A5-2958-4CDE-AD19-AD97FEC5EAEF}" type="datetimeFigureOut">
               <a:rPr lang="en-CA" smtClean="0"/>
-              <a:t>2015-03-31</a:t>
+              <a:t>2015-04-01</a:t>
             </a:fld>
             <a:endParaRPr lang="en-CA"/>
           </a:p>
@@ -609,7 +609,7 @@
           <a:p>
             <a:fld id="{01B101A5-2958-4CDE-AD19-AD97FEC5EAEF}" type="datetimeFigureOut">
               <a:rPr lang="en-CA" smtClean="0"/>
-              <a:t>2015-03-31</a:t>
+              <a:t>2015-04-01</a:t>
             </a:fld>
             <a:endParaRPr lang="en-CA"/>
           </a:p>
@@ -889,7 +889,7 @@
           <a:p>
             <a:fld id="{01B101A5-2958-4CDE-AD19-AD97FEC5EAEF}" type="datetimeFigureOut">
               <a:rPr lang="en-CA" smtClean="0"/>
-              <a:t>2015-03-31</a:t>
+              <a:t>2015-04-01</a:t>
             </a:fld>
             <a:endParaRPr lang="en-CA"/>
           </a:p>
@@ -1068,7 +1068,7 @@
           <a:p>
             <a:fld id="{01B101A5-2958-4CDE-AD19-AD97FEC5EAEF}" type="datetimeFigureOut">
               <a:rPr lang="en-CA" smtClean="0"/>
-              <a:t>2015-03-31</a:t>
+              <a:t>2015-04-01</a:t>
             </a:fld>
             <a:endParaRPr lang="en-CA"/>
           </a:p>
@@ -1426,7 +1426,7 @@
           <a:p>
             <a:fld id="{01B101A5-2958-4CDE-AD19-AD97FEC5EAEF}" type="datetimeFigureOut">
               <a:rPr lang="en-CA" smtClean="0"/>
-              <a:t>2015-03-31</a:t>
+              <a:t>2015-04-01</a:t>
             </a:fld>
             <a:endParaRPr lang="en-CA"/>
           </a:p>
@@ -1713,7 +1713,7 @@
           <a:p>
             <a:fld id="{01B101A5-2958-4CDE-AD19-AD97FEC5EAEF}" type="datetimeFigureOut">
               <a:rPr lang="en-CA" smtClean="0"/>
-              <a:t>2015-03-31</a:t>
+              <a:t>2015-04-01</a:t>
             </a:fld>
             <a:endParaRPr lang="en-CA"/>
           </a:p>
@@ -2135,7 +2135,7 @@
           <a:p>
             <a:fld id="{01B101A5-2958-4CDE-AD19-AD97FEC5EAEF}" type="datetimeFigureOut">
               <a:rPr lang="en-CA" smtClean="0"/>
-              <a:t>2015-03-31</a:t>
+              <a:t>2015-04-01</a:t>
             </a:fld>
             <a:endParaRPr lang="en-CA"/>
           </a:p>
@@ -2250,7 +2250,7 @@
           <a:p>
             <a:fld id="{01B101A5-2958-4CDE-AD19-AD97FEC5EAEF}" type="datetimeFigureOut">
               <a:rPr lang="en-CA" smtClean="0"/>
-              <a:t>2015-03-31</a:t>
+              <a:t>2015-04-01</a:t>
             </a:fld>
             <a:endParaRPr lang="en-CA"/>
           </a:p>
@@ -2340,7 +2340,7 @@
           <a:p>
             <a:fld id="{01B101A5-2958-4CDE-AD19-AD97FEC5EAEF}" type="datetimeFigureOut">
               <a:rPr lang="en-CA" smtClean="0"/>
-              <a:t>2015-03-31</a:t>
+              <a:t>2015-04-01</a:t>
             </a:fld>
             <a:endParaRPr lang="en-CA"/>
           </a:p>
@@ -2618,7 +2618,7 @@
           <a:p>
             <a:fld id="{01B101A5-2958-4CDE-AD19-AD97FEC5EAEF}" type="datetimeFigureOut">
               <a:rPr lang="en-CA" smtClean="0"/>
-              <a:t>2015-03-31</a:t>
+              <a:t>2015-04-01</a:t>
             </a:fld>
             <a:endParaRPr lang="en-CA"/>
           </a:p>
@@ -2984,7 +2984,7 @@
           <a:p>
             <a:fld id="{01B101A5-2958-4CDE-AD19-AD97FEC5EAEF}" type="datetimeFigureOut">
               <a:rPr lang="en-CA" smtClean="0"/>
-              <a:t>2015-03-31</a:t>
+              <a:t>2015-04-01</a:t>
             </a:fld>
             <a:endParaRPr lang="en-CA"/>
           </a:p>
@@ -3421,7 +3421,7 @@
           <a:p>
             <a:fld id="{01B101A5-2958-4CDE-AD19-AD97FEC5EAEF}" type="datetimeFigureOut">
               <a:rPr lang="en-CA" smtClean="0"/>
-              <a:t>2015-03-31</a:t>
+              <a:t>2015-04-01</a:t>
             </a:fld>
             <a:endParaRPr lang="en-CA"/>
           </a:p>
@@ -4214,8 +4214,114 @@
           <a:p>
             <a:r>
               <a:rPr lang="en-CA" dirty="0" smtClean="0"/>
-              <a:t>Main Transactions</a:t>
-            </a:r>
+              <a:t>Capabilities</a:t>
+            </a:r>
+            <a:endParaRPr lang="en-CA" dirty="0"/>
+          </a:p>
+        </p:txBody>
+      </p:sp>
+      <p:sp>
+        <p:nvSpPr>
+          <p:cNvPr id="3" name="Content Placeholder 2"/>
+          <p:cNvSpPr>
+            <a:spLocks noGrp="1"/>
+          </p:cNvSpPr>
+          <p:nvPr>
+            <p:ph idx="1"/>
+          </p:nvPr>
+        </p:nvSpPr>
+        <p:spPr>
+          <a:xfrm>
+            <a:off x="107504" y="1916832"/>
+            <a:ext cx="8784976" cy="5184576"/>
+          </a:xfrm>
+        </p:spPr>
+        <p:txBody>
+          <a:bodyPr>
+            <a:normAutofit fontScale="70000" lnSpcReduction="20000"/>
+          </a:bodyPr>
+          <a:lstStyle/>
+          <a:p>
+            <a:pPr lvl="1">
+              <a:buClr>
+                <a:schemeClr val="accent1"/>
+              </a:buClr>
+            </a:pPr>
+            <a:r>
+              <a:rPr lang="en-US" sz="5100" dirty="0" smtClean="0"/>
+              <a:t>Collection </a:t>
+            </a:r>
+            <a:r>
+              <a:rPr lang="en-US" sz="5100" dirty="0"/>
+              <a:t>of various data: personal information, complaints, to do list, etc…</a:t>
+            </a:r>
+            <a:endParaRPr lang="en-CA" sz="5100" dirty="0"/>
+          </a:p>
+          <a:p>
+            <a:pPr lvl="1">
+              <a:buClr>
+                <a:schemeClr val="accent1"/>
+              </a:buClr>
+            </a:pPr>
+            <a:r>
+              <a:rPr lang="en-US" sz="5100" dirty="0"/>
+              <a:t>Reporting to help sales representative to understand data and build strategy</a:t>
+            </a:r>
+            <a:endParaRPr lang="en-CA" sz="5100" dirty="0"/>
+          </a:p>
+          <a:p>
+            <a:pPr lvl="1">
+              <a:buClr>
+                <a:schemeClr val="accent1"/>
+              </a:buClr>
+            </a:pPr>
+            <a:r>
+              <a:rPr lang="en-US" sz="5100" dirty="0"/>
+              <a:t>Create personalized marketing</a:t>
+            </a:r>
+            <a:endParaRPr lang="en-CA" sz="5100" dirty="0"/>
+          </a:p>
+          <a:p>
+            <a:pPr lvl="1">
+              <a:buClr>
+                <a:schemeClr val="accent1"/>
+              </a:buClr>
+            </a:pPr>
+            <a:r>
+              <a:rPr lang="en-US" sz="5100" dirty="0"/>
+              <a:t>Cloud Portability</a:t>
+            </a:r>
+            <a:endParaRPr lang="en-CA" sz="5100" dirty="0"/>
+          </a:p>
+          <a:p>
+            <a:pPr lvl="1">
+              <a:buClr>
+                <a:schemeClr val="accent1"/>
+              </a:buClr>
+            </a:pPr>
+            <a:r>
+              <a:rPr lang="en-US" sz="5100" dirty="0"/>
+              <a:t>Strong Flexibility - highly configurable</a:t>
+            </a:r>
+            <a:r>
+              <a:rPr lang="en-US" sz="6200" dirty="0"/>
+              <a:t> </a:t>
+            </a:r>
+            <a:endParaRPr lang="en-CA" sz="6200" dirty="0"/>
+          </a:p>
+          <a:p>
+            <a:pPr marL="118872" indent="0">
+              <a:buNone/>
+            </a:pPr>
+            <a:endParaRPr lang="en-CA" sz="6200" dirty="0" smtClean="0"/>
+          </a:p>
+          <a:p>
+            <a:pPr marL="118872" indent="0">
+              <a:buNone/>
+            </a:pPr>
+            <a:endParaRPr lang="en-CA" sz="6200" dirty="0"/>
+          </a:p>
+          <a:p>
             <a:endParaRPr lang="en-CA" dirty="0"/>
           </a:p>
         </p:txBody>
@@ -4223,7 +4329,7 @@
     </p:spTree>
     <p:extLst>
       <p:ext uri="{BB962C8B-B14F-4D97-AF65-F5344CB8AC3E}">
-        <p14:creationId xmlns:p14="http://schemas.microsoft.com/office/powerpoint/2010/main" val="1259697313"/>
+        <p14:creationId xmlns:p14="http://schemas.microsoft.com/office/powerpoint/2010/main" val="3763193681"/>
       </p:ext>
     </p:extLst>
   </p:cSld>
@@ -4266,10 +4372,9 @@
           <a:lstStyle/>
           <a:p>
             <a:r>
-              <a:rPr lang="en-CA" dirty="0" smtClean="0"/>
-              <a:t>Capabilities</a:t>
-            </a:r>
-            <a:endParaRPr lang="en-CA" dirty="0"/>
+              <a:rPr lang="en-CA" dirty="0"/>
+              <a:t>Benefits</a:t>
+            </a:r>
           </a:p>
         </p:txBody>
       </p:sp>
@@ -4285,13 +4390,13 @@
         </p:nvSpPr>
         <p:spPr>
           <a:xfrm>
-            <a:off x="107504" y="1916832"/>
-            <a:ext cx="8784976" cy="5184576"/>
+            <a:off x="179512" y="1772816"/>
+            <a:ext cx="8784976" cy="4625609"/>
           </a:xfrm>
         </p:spPr>
         <p:txBody>
           <a:bodyPr>
-            <a:normAutofit fontScale="70000" lnSpcReduction="20000"/>
+            <a:noAutofit/>
           </a:bodyPr>
           <a:lstStyle/>
           <a:p>
@@ -4301,14 +4406,14 @@
               </a:buClr>
             </a:pPr>
             <a:r>
-              <a:rPr lang="en-US" sz="5100" dirty="0" smtClean="0"/>
-              <a:t>Collection </a:t>
-            </a:r>
-            <a:r>
-              <a:rPr lang="en-US" sz="5100" dirty="0"/>
-              <a:t>of various data: personal information, complaints, to do list, etc…</a:t>
-            </a:r>
-            <a:endParaRPr lang="en-CA" sz="5100" dirty="0"/>
+              <a:rPr lang="en-US" sz="3200" dirty="0" smtClean="0"/>
+              <a:t>Convenient </a:t>
+            </a:r>
+            <a:r>
+              <a:rPr lang="en-US" sz="3200" dirty="0"/>
+              <a:t>– everything in one place, also it is available online</a:t>
+            </a:r>
+            <a:endParaRPr lang="en-CA" sz="3200" dirty="0"/>
           </a:p>
           <a:p>
             <a:pPr lvl="1">
@@ -4317,10 +4422,10 @@
               </a:buClr>
             </a:pPr>
             <a:r>
-              <a:rPr lang="en-US" sz="5100" dirty="0"/>
-              <a:t>Reporting to help sales representative to understand data and build strategy</a:t>
-            </a:r>
-            <a:endParaRPr lang="en-CA" sz="5100" dirty="0"/>
+              <a:rPr lang="en-US" sz="3200" dirty="0"/>
+              <a:t>Saves time – reporting organizes data in different ways, automated emails</a:t>
+            </a:r>
+            <a:endParaRPr lang="en-CA" sz="3200" dirty="0"/>
           </a:p>
           <a:p>
             <a:pPr lvl="1">
@@ -4329,10 +4434,10 @@
               </a:buClr>
             </a:pPr>
             <a:r>
-              <a:rPr lang="en-US" sz="5100" dirty="0"/>
-              <a:t>Create personalized marketing</a:t>
-            </a:r>
-            <a:endParaRPr lang="en-CA" sz="5100" dirty="0"/>
+              <a:rPr lang="en-US" sz="3200" dirty="0"/>
+              <a:t>Sales improvements – getting more customers, customizing communication</a:t>
+            </a:r>
+            <a:endParaRPr lang="en-CA" sz="3200" dirty="0"/>
           </a:p>
           <a:p>
             <a:pPr lvl="1">
@@ -4341,38 +4446,10 @@
               </a:buClr>
             </a:pPr>
             <a:r>
-              <a:rPr lang="en-US" sz="5100" dirty="0"/>
-              <a:t>Cloud Portability</a:t>
-            </a:r>
-            <a:endParaRPr lang="en-CA" sz="5100" dirty="0"/>
-          </a:p>
-          <a:p>
-            <a:pPr lvl="1">
-              <a:buClr>
-                <a:schemeClr val="accent1"/>
-              </a:buClr>
-            </a:pPr>
-            <a:r>
-              <a:rPr lang="en-US" sz="5100" dirty="0"/>
-              <a:t>Strong Flexibility - highly configurable</a:t>
-            </a:r>
-            <a:r>
-              <a:rPr lang="en-US" sz="6200" dirty="0"/>
-              <a:t> </a:t>
-            </a:r>
-            <a:endParaRPr lang="en-CA" sz="6200" dirty="0"/>
-          </a:p>
-          <a:p>
-            <a:pPr marL="118872" indent="0">
-              <a:buNone/>
-            </a:pPr>
-            <a:endParaRPr lang="en-CA" sz="6200" dirty="0" smtClean="0"/>
-          </a:p>
-          <a:p>
-            <a:pPr marL="118872" indent="0">
-              <a:buNone/>
-            </a:pPr>
-            <a:endParaRPr lang="en-CA" sz="6200" dirty="0"/>
+              <a:rPr lang="en-US" sz="3200" dirty="0"/>
+              <a:t>Customer satisfaction – the more the company knows about the customer the better it can serve that customer</a:t>
+            </a:r>
+            <a:endParaRPr lang="en-CA" sz="3200" dirty="0"/>
           </a:p>
           <a:p>
             <a:endParaRPr lang="en-CA" dirty="0"/>
@@ -4382,7 +4459,7 @@
     </p:spTree>
     <p:extLst>
       <p:ext uri="{BB962C8B-B14F-4D97-AF65-F5344CB8AC3E}">
-        <p14:creationId xmlns:p14="http://schemas.microsoft.com/office/powerpoint/2010/main" val="3763193681"/>
+        <p14:creationId xmlns:p14="http://schemas.microsoft.com/office/powerpoint/2010/main" val="2100844412"/>
       </p:ext>
     </p:extLst>
   </p:cSld>
@@ -4425,9 +4502,10 @@
           <a:lstStyle/>
           <a:p>
             <a:r>
-              <a:rPr lang="en-CA" dirty="0"/>
-              <a:t>Benefits</a:t>
-            </a:r>
+              <a:rPr lang="en-CA" dirty="0" smtClean="0"/>
+              <a:t>Customization &amp; Integration</a:t>
+            </a:r>
+            <a:endParaRPr lang="en-CA" dirty="0"/>
           </a:p>
         </p:txBody>
       </p:sp>
@@ -4441,70 +4519,119 @@
             <p:ph idx="1"/>
           </p:nvPr>
         </p:nvSpPr>
-        <p:spPr>
-          <a:xfrm>
-            <a:off x="179512" y="1772816"/>
-            <a:ext cx="8784976" cy="4625609"/>
-          </a:xfrm>
-        </p:spPr>
-        <p:txBody>
-          <a:bodyPr>
-            <a:noAutofit/>
-          </a:bodyPr>
+        <p:spPr/>
+        <p:txBody>
+          <a:bodyPr/>
           <a:lstStyle/>
           <a:p>
-            <a:pPr lvl="1">
-              <a:buClr>
-                <a:schemeClr val="accent1"/>
-              </a:buClr>
+            <a:pPr marL="118872" indent="0">
+              <a:buNone/>
             </a:pPr>
             <a:r>
-              <a:rPr lang="en-US" sz="3200" dirty="0" smtClean="0"/>
-              <a:t>Convenient </a:t>
-            </a:r>
-            <a:r>
-              <a:rPr lang="en-US" sz="3200" dirty="0"/>
-              <a:t>– everything in one place, also it is available online</a:t>
-            </a:r>
-            <a:endParaRPr lang="en-CA" sz="3200" dirty="0"/>
-          </a:p>
-          <a:p>
-            <a:pPr lvl="1">
-              <a:buClr>
-                <a:schemeClr val="accent1"/>
-              </a:buClr>
+              <a:rPr lang="en-US" sz="2400" b="1" dirty="0" smtClean="0"/>
+              <a:t>Types of Customization:</a:t>
+            </a:r>
+          </a:p>
+          <a:p>
+            <a:r>
+              <a:rPr lang="en-US" sz="2400" dirty="0" smtClean="0"/>
+              <a:t>Custom </a:t>
+            </a:r>
+            <a:r>
+              <a:rPr lang="en-US" sz="2400" dirty="0"/>
+              <a:t>development by the source code available on </a:t>
+            </a:r>
+            <a:r>
+              <a:rPr lang="en-US" sz="2400" dirty="0" err="1" smtClean="0"/>
+              <a:t>SourceForge</a:t>
+            </a:r>
+            <a:endParaRPr lang="en-US" sz="2400" dirty="0" smtClean="0"/>
+          </a:p>
+          <a:p>
+            <a:r>
+              <a:rPr lang="en-US" sz="2400" dirty="0"/>
+              <a:t>Assisted by </a:t>
+            </a:r>
+            <a:r>
+              <a:rPr lang="en-US" sz="2400" dirty="0" err="1"/>
+              <a:t>xTuple’s</a:t>
+            </a:r>
+            <a:r>
+              <a:rPr lang="en-US" sz="2400" dirty="0"/>
+              <a:t> Developer </a:t>
+            </a:r>
+            <a:r>
+              <a:rPr lang="en-US" sz="2400" dirty="0" smtClean="0"/>
+              <a:t>Team</a:t>
+            </a:r>
+          </a:p>
+          <a:p>
+            <a:pPr marL="118872" indent="0">
+              <a:buNone/>
             </a:pPr>
-            <a:r>
-              <a:rPr lang="en-US" sz="3200" dirty="0"/>
-              <a:t>Saves time – reporting organizes data in different ways, automated emails</a:t>
-            </a:r>
-            <a:endParaRPr lang="en-CA" sz="3200" dirty="0"/>
-          </a:p>
-          <a:p>
-            <a:pPr lvl="1">
-              <a:buClr>
-                <a:schemeClr val="accent1"/>
-              </a:buClr>
+            <a:endParaRPr lang="en-US" sz="2400" dirty="0" smtClean="0"/>
+          </a:p>
+          <a:p>
+            <a:pPr marL="118872" indent="0">
+              <a:buNone/>
             </a:pPr>
             <a:r>
-              <a:rPr lang="en-US" sz="3200" dirty="0"/>
-              <a:t>Sales improvements – getting more customers, customizing communication</a:t>
-            </a:r>
-            <a:endParaRPr lang="en-CA" sz="3200" dirty="0"/>
-          </a:p>
-          <a:p>
-            <a:pPr lvl="1">
-              <a:buClr>
-                <a:schemeClr val="accent1"/>
-              </a:buClr>
+              <a:rPr lang="en-US" sz="2400" b="1" dirty="0" smtClean="0"/>
+              <a:t>Integration:</a:t>
+            </a:r>
+          </a:p>
+          <a:p>
+            <a:r>
+              <a:rPr lang="en-US" sz="2400" dirty="0" smtClean="0"/>
+              <a:t>Supported </a:t>
+            </a:r>
+            <a:r>
+              <a:rPr lang="en-US" sz="2400" dirty="0"/>
+              <a:t>by Windows, Linux and Mac because it uses open source </a:t>
+            </a:r>
+            <a:r>
+              <a:rPr lang="en-US" sz="2400" dirty="0" smtClean="0"/>
+              <a:t>technologies</a:t>
+            </a:r>
+          </a:p>
+          <a:p>
+            <a:r>
+              <a:rPr lang="en-US" sz="2400" dirty="0" smtClean="0"/>
+              <a:t>Mobile </a:t>
+            </a:r>
+            <a:r>
+              <a:rPr lang="en-US" sz="2400" dirty="0"/>
+              <a:t>web client that uses </a:t>
+            </a:r>
+            <a:r>
+              <a:rPr lang="en-US" sz="2400" dirty="0" smtClean="0"/>
+              <a:t>HTML5</a:t>
+            </a:r>
+          </a:p>
+          <a:p>
+            <a:r>
+              <a:rPr lang="en-US" sz="2400" dirty="0"/>
+              <a:t>D</a:t>
+            </a:r>
+            <a:r>
+              <a:rPr lang="en-US" sz="2400" dirty="0" smtClean="0"/>
+              <a:t>oes </a:t>
+            </a:r>
+            <a:r>
+              <a:rPr lang="en-US" sz="2400" dirty="0"/>
+              <a:t>not have integration with social media plugins or office applications</a:t>
+            </a:r>
+          </a:p>
+          <a:p>
+            <a:pPr marL="118872" indent="0">
+              <a:buNone/>
             </a:pPr>
-            <a:r>
-              <a:rPr lang="en-US" sz="3200" dirty="0"/>
-              <a:t>Customer satisfaction – the more the company knows about the customer the better it can serve that customer</a:t>
-            </a:r>
-            <a:endParaRPr lang="en-CA" sz="3200" dirty="0"/>
-          </a:p>
-          <a:p>
+            <a:endParaRPr lang="en-US" dirty="0" smtClean="0"/>
+          </a:p>
+          <a:p>
+            <a:pPr marL="118872" indent="0">
+              <a:buNone/>
+            </a:pPr>
             <a:endParaRPr lang="en-CA" dirty="0"/>
           </a:p>
         </p:txBody>
@@ -4512,7 +4639,7 @@
     </p:spTree>
     <p:extLst>
       <p:ext uri="{BB962C8B-B14F-4D97-AF65-F5344CB8AC3E}">
-        <p14:creationId xmlns:p14="http://schemas.microsoft.com/office/powerpoint/2010/main" val="2100844412"/>
+        <p14:creationId xmlns:p14="http://schemas.microsoft.com/office/powerpoint/2010/main" val="169634887"/>
       </p:ext>
     </p:extLst>
   </p:cSld>
@@ -4556,7 +4683,7 @@
           <a:p>
             <a:r>
               <a:rPr lang="en-CA" dirty="0" smtClean="0"/>
-              <a:t>Customization &amp; Integration</a:t>
+              <a:t>Additional CRM Applications</a:t>
             </a:r>
             <a:endParaRPr lang="en-CA" dirty="0"/>
           </a:p>
@@ -4577,115 +4704,62 @@
           <a:bodyPr/>
           <a:lstStyle/>
           <a:p>
+            <a:r>
+              <a:rPr lang="en-CA" dirty="0" smtClean="0"/>
+              <a:t>Salesforce.com</a:t>
+            </a:r>
+          </a:p>
+          <a:p>
             <a:pPr marL="118872" indent="0">
               <a:buNone/>
             </a:pPr>
-            <a:r>
-              <a:rPr lang="en-US" sz="2400" b="1" dirty="0" smtClean="0"/>
-              <a:t>Types of Customization:</a:t>
-            </a:r>
-          </a:p>
-          <a:p>
-            <a:r>
-              <a:rPr lang="en-US" sz="2400" dirty="0" smtClean="0"/>
-              <a:t>Custom </a:t>
-            </a:r>
-            <a:r>
-              <a:rPr lang="en-US" sz="2400" dirty="0"/>
-              <a:t>development by the source code available on </a:t>
-            </a:r>
-            <a:r>
-              <a:rPr lang="en-US" sz="2400" dirty="0" err="1" smtClean="0"/>
-              <a:t>SourceForge</a:t>
-            </a:r>
-            <a:endParaRPr lang="en-US" sz="2400" dirty="0" smtClean="0"/>
-          </a:p>
-          <a:p>
-            <a:r>
-              <a:rPr lang="en-US" sz="2400" dirty="0"/>
-              <a:t>Assisted by </a:t>
-            </a:r>
-            <a:r>
-              <a:rPr lang="en-US" sz="2400" dirty="0" err="1"/>
-              <a:t>xTuple’s</a:t>
-            </a:r>
-            <a:r>
-              <a:rPr lang="en-US" sz="2400" dirty="0"/>
-              <a:t> Developer </a:t>
-            </a:r>
-            <a:r>
-              <a:rPr lang="en-US" sz="2400" dirty="0" smtClean="0"/>
-              <a:t>Team</a:t>
+            <a:endParaRPr lang="en-CA" dirty="0" smtClean="0"/>
+          </a:p>
+          <a:p>
+            <a:r>
+              <a:rPr lang="en-CA" dirty="0" smtClean="0"/>
+              <a:t>Microsoft Dynamics CRM</a:t>
             </a:r>
           </a:p>
           <a:p>
             <a:pPr marL="118872" indent="0">
               <a:buNone/>
             </a:pPr>
-            <a:endParaRPr lang="en-US" sz="2400" dirty="0" smtClean="0"/>
+            <a:endParaRPr lang="en-CA" dirty="0" smtClean="0"/>
+          </a:p>
+          <a:p>
+            <a:r>
+              <a:rPr lang="en-CA" dirty="0" err="1" smtClean="0"/>
+              <a:t>Zoho</a:t>
+            </a:r>
+            <a:endParaRPr lang="en-CA" dirty="0" smtClean="0"/>
           </a:p>
           <a:p>
             <a:pPr marL="118872" indent="0">
               <a:buNone/>
             </a:pPr>
-            <a:r>
-              <a:rPr lang="en-US" sz="2400" b="1" dirty="0" smtClean="0"/>
-              <a:t>Integration:</a:t>
-            </a:r>
-          </a:p>
-          <a:p>
-            <a:r>
-              <a:rPr lang="en-US" sz="2400" dirty="0" smtClean="0"/>
-              <a:t>Supported </a:t>
-            </a:r>
-            <a:r>
-              <a:rPr lang="en-US" sz="2400" dirty="0"/>
-              <a:t>by Windows, Linux and Mac because it uses open source </a:t>
-            </a:r>
-            <a:r>
-              <a:rPr lang="en-US" sz="2400" dirty="0" smtClean="0"/>
-              <a:t>technologies</a:t>
-            </a:r>
-          </a:p>
-          <a:p>
-            <a:r>
-              <a:rPr lang="en-US" sz="2400" dirty="0" smtClean="0"/>
-              <a:t>Mobile </a:t>
-            </a:r>
-            <a:r>
-              <a:rPr lang="en-US" sz="2400" dirty="0"/>
-              <a:t>web client that uses </a:t>
-            </a:r>
-            <a:r>
-              <a:rPr lang="en-US" sz="2400" dirty="0" smtClean="0"/>
-              <a:t>HTML5</a:t>
-            </a:r>
-          </a:p>
-          <a:p>
-            <a:r>
-              <a:rPr lang="en-US" sz="2400" dirty="0"/>
-              <a:t>D</a:t>
-            </a:r>
-            <a:r>
-              <a:rPr lang="en-US" sz="2400" dirty="0" smtClean="0"/>
-              <a:t>oes </a:t>
-            </a:r>
-            <a:r>
-              <a:rPr lang="en-US" sz="2400" dirty="0"/>
-              <a:t>not have integration with social media plugins or office applications</a:t>
-            </a:r>
-            <a:endParaRPr lang="en-US" sz="2400" dirty="0"/>
+            <a:endParaRPr lang="en-CA" dirty="0" smtClean="0"/>
+          </a:p>
+          <a:p>
+            <a:r>
+              <a:rPr lang="en-CA" dirty="0" err="1" smtClean="0"/>
+              <a:t>SugarCRM</a:t>
+            </a:r>
+            <a:endParaRPr lang="en-CA" dirty="0" smtClean="0"/>
           </a:p>
           <a:p>
             <a:pPr marL="118872" indent="0">
               <a:buNone/>
             </a:pPr>
-            <a:endParaRPr lang="en-US" dirty="0" smtClean="0"/>
-          </a:p>
-          <a:p>
-            <a:pPr marL="118872" indent="0">
-              <a:buNone/>
-            </a:pPr>
+            <a:endParaRPr lang="en-CA" dirty="0" smtClean="0"/>
+          </a:p>
+          <a:p>
+            <a:r>
+              <a:rPr lang="en-CA" dirty="0" smtClean="0"/>
+              <a:t>Maximizer CRM</a:t>
+            </a:r>
+          </a:p>
+          <a:p>
             <a:endParaRPr lang="en-CA" dirty="0"/>
           </a:p>
         </p:txBody>
@@ -4693,7 +4767,7 @@
     </p:spTree>
     <p:extLst>
       <p:ext uri="{BB962C8B-B14F-4D97-AF65-F5344CB8AC3E}">
-        <p14:creationId xmlns:p14="http://schemas.microsoft.com/office/powerpoint/2010/main" val="169634887"/>
+        <p14:creationId xmlns:p14="http://schemas.microsoft.com/office/powerpoint/2010/main" val="2580310718"/>
       </p:ext>
     </p:extLst>
   </p:cSld>
@@ -4730,90 +4804,24 @@
             <p:ph type="title"/>
           </p:nvPr>
         </p:nvSpPr>
-        <p:spPr/>
+        <p:spPr>
+          <a:xfrm>
+            <a:off x="1547664" y="3212976"/>
+            <a:ext cx="6552728" cy="1251062"/>
+          </a:xfrm>
+        </p:spPr>
         <p:txBody>
           <a:bodyPr/>
           <a:lstStyle/>
           <a:p>
             <a:r>
               <a:rPr lang="en-CA" dirty="0" smtClean="0"/>
-              <a:t>Additional CRM Applications</a:t>
-            </a:r>
-            <a:endParaRPr lang="en-CA" dirty="0"/>
-          </a:p>
-        </p:txBody>
-      </p:sp>
-      <p:sp>
-        <p:nvSpPr>
-          <p:cNvPr id="3" name="Content Placeholder 2"/>
-          <p:cNvSpPr>
-            <a:spLocks noGrp="1"/>
-          </p:cNvSpPr>
-          <p:nvPr>
-            <p:ph idx="1"/>
-          </p:nvPr>
-        </p:nvSpPr>
-        <p:spPr/>
-        <p:txBody>
-          <a:bodyPr/>
-          <a:lstStyle/>
-          <a:p>
+              <a:t>Main </a:t>
+            </a:r>
             <a:r>
               <a:rPr lang="en-CA" dirty="0" smtClean="0"/>
-              <a:t>Salesforce.com</a:t>
-            </a:r>
-          </a:p>
-          <a:p>
-            <a:pPr marL="118872" indent="0">
-              <a:buNone/>
-            </a:pPr>
-            <a:endParaRPr lang="en-CA" dirty="0" smtClean="0"/>
-          </a:p>
-          <a:p>
-            <a:r>
-              <a:rPr lang="en-CA" dirty="0" smtClean="0"/>
-              <a:t>Microsoft Dynamics CRM</a:t>
-            </a:r>
-          </a:p>
-          <a:p>
-            <a:pPr marL="118872" indent="0">
-              <a:buNone/>
-            </a:pPr>
-            <a:endParaRPr lang="en-CA" dirty="0" smtClean="0"/>
-          </a:p>
-          <a:p>
-            <a:r>
-              <a:rPr lang="en-CA" dirty="0" err="1" smtClean="0"/>
-              <a:t>Zoho</a:t>
-            </a:r>
-            <a:endParaRPr lang="en-CA" dirty="0" smtClean="0"/>
-          </a:p>
-          <a:p>
-            <a:pPr marL="118872" indent="0">
-              <a:buNone/>
-            </a:pPr>
-            <a:endParaRPr lang="en-CA" dirty="0" smtClean="0"/>
-          </a:p>
-          <a:p>
-            <a:r>
-              <a:rPr lang="en-CA" dirty="0" err="1" smtClean="0"/>
-              <a:t>SugarCRM</a:t>
-            </a:r>
-            <a:endParaRPr lang="en-CA" dirty="0" smtClean="0"/>
-          </a:p>
-          <a:p>
-            <a:pPr marL="118872" indent="0">
-              <a:buNone/>
-            </a:pPr>
-            <a:endParaRPr lang="en-CA" dirty="0" smtClean="0"/>
-          </a:p>
-          <a:p>
-            <a:r>
-              <a:rPr lang="en-CA" dirty="0" smtClean="0"/>
-              <a:t>Maximizer CRM</a:t>
-            </a:r>
-          </a:p>
-          <a:p>
+              <a:t>Transactions Demo</a:t>
+            </a:r>
             <a:endParaRPr lang="en-CA" dirty="0"/>
           </a:p>
         </p:txBody>
@@ -4821,7 +4829,7 @@
     </p:spTree>
     <p:extLst>
       <p:ext uri="{BB962C8B-B14F-4D97-AF65-F5344CB8AC3E}">
-        <p14:creationId xmlns:p14="http://schemas.microsoft.com/office/powerpoint/2010/main" val="2580310718"/>
+        <p14:creationId xmlns:p14="http://schemas.microsoft.com/office/powerpoint/2010/main" val="1259697313"/>
       </p:ext>
     </p:extLst>
   </p:cSld>

</xml_diff>